<commit_message>
changes to one slide
</commit_message>
<xml_diff>
--- a/PowerPoint Slides/09 - Constraint Analysis.pptx
+++ b/PowerPoint Slides/09 - Constraint Analysis.pptx
@@ -5700,7 +5700,12 @@
             <p:ph idx="1"/>
           </p:nvPr>
         </p:nvSpPr>
-        <p:spPr/>
+        <p:spPr>
+          <a:xfrm>
+            <a:off x="458787" y="1363663"/>
+            <a:ext cx="8321040" cy="4935537"/>
+          </a:xfrm>
+        </p:spPr>
         <p:txBody>
           <a:bodyPr tIns="91440"/>
           <a:lstStyle/>
@@ -5779,7 +5784,7 @@
                 <a:latin typeface="Consolas" pitchFamily="49" charset="0"/>
                 <a:cs typeface="Consolas" pitchFamily="49" charset="0"/>
               </a:rPr>
-              <a:t>    if (</a:t>
+              <a:t>    assert </a:t>
             </a:r>
             <a:r>
               <a:rPr lang="en-US" sz="1800" dirty="0" err="1">
@@ -5793,7 +5798,21 @@
                 <a:latin typeface="Consolas" pitchFamily="49" charset="0"/>
                 <a:cs typeface="Consolas" pitchFamily="49" charset="0"/>
               </a:rPr>
-              <a:t> != null)</a:t>
+              <a:t> != null : "</a:t>
+            </a:r>
+            <a:r>
+              <a:rPr lang="en-US" sz="1800" dirty="0" err="1">
+                <a:latin typeface="Consolas" pitchFamily="49" charset="0"/>
+                <a:cs typeface="Consolas" pitchFamily="49" charset="0"/>
+              </a:rPr>
+              <a:t>declPart</a:t>
+            </a:r>
+            <a:r>
+              <a:rPr lang="en-US" sz="1800" dirty="0">
+                <a:latin typeface="Consolas" pitchFamily="49" charset="0"/>
+                <a:cs typeface="Consolas" pitchFamily="49" charset="0"/>
+              </a:rPr>
+              <a:t> should never be null";</a:t>
             </a:r>
           </a:p>
           <a:p>
@@ -5809,7 +5828,35 @@
                 <a:latin typeface="Consolas" pitchFamily="49" charset="0"/>
                 <a:cs typeface="Consolas" pitchFamily="49" charset="0"/>
               </a:rPr>
-              <a:t>        declPart.checkConstraints();</a:t>
+              <a:t>    assert </a:t>
+            </a:r>
+            <a:r>
+              <a:rPr lang="en-US" sz="1800" dirty="0" err="1">
+                <a:latin typeface="Consolas" pitchFamily="49" charset="0"/>
+                <a:cs typeface="Consolas" pitchFamily="49" charset="0"/>
+              </a:rPr>
+              <a:t>stmtPart</a:t>
+            </a:r>
+            <a:r>
+              <a:rPr lang="en-US" sz="1800" dirty="0">
+                <a:latin typeface="Consolas" pitchFamily="49" charset="0"/>
+                <a:cs typeface="Consolas" pitchFamily="49" charset="0"/>
+              </a:rPr>
+              <a:t> != null : "</a:t>
+            </a:r>
+            <a:r>
+              <a:rPr lang="en-US" sz="1800" dirty="0" err="1">
+                <a:latin typeface="Consolas" pitchFamily="49" charset="0"/>
+                <a:cs typeface="Consolas" pitchFamily="49" charset="0"/>
+              </a:rPr>
+              <a:t>stmtPart</a:t>
+            </a:r>
+            <a:r>
+              <a:rPr lang="en-US" sz="1800" dirty="0">
+                <a:latin typeface="Consolas" pitchFamily="49" charset="0"/>
+                <a:cs typeface="Consolas" pitchFamily="49" charset="0"/>
+              </a:rPr>
+              <a:t> should never be null";</a:t>
             </a:r>
           </a:p>
           <a:p>
@@ -5838,7 +5885,51 @@
                 <a:latin typeface="Consolas" pitchFamily="49" charset="0"/>
                 <a:cs typeface="Consolas" pitchFamily="49" charset="0"/>
               </a:rPr>
-              <a:t>    stmtPart.checkConstraints();</a:t>
+              <a:t>    </a:t>
+            </a:r>
+            <a:r>
+              <a:rPr lang="en-US" sz="1800" dirty="0" err="1">
+                <a:latin typeface="Consolas" pitchFamily="49" charset="0"/>
+                <a:cs typeface="Consolas" pitchFamily="49" charset="0"/>
+              </a:rPr>
+              <a:t>declPart.checkConstraints</a:t>
+            </a:r>
+            <a:r>
+              <a:rPr lang="en-US" sz="1800" dirty="0">
+                <a:latin typeface="Consolas" pitchFamily="49" charset="0"/>
+                <a:cs typeface="Consolas" pitchFamily="49" charset="0"/>
+              </a:rPr>
+              <a:t>();</a:t>
+            </a:r>
+          </a:p>
+          <a:p>
+            <a:pPr marL="274320" lvl="1" indent="0">
+              <a:spcBef>
+                <a:spcPts val="200"/>
+              </a:spcBef>
+              <a:buFontTx/>
+              <a:buNone/>
+            </a:pPr>
+            <a:r>
+              <a:rPr lang="en-US" sz="1800" dirty="0">
+                <a:latin typeface="Consolas" pitchFamily="49" charset="0"/>
+                <a:cs typeface="Consolas" pitchFamily="49" charset="0"/>
+              </a:rPr>
+              <a:t>    </a:t>
+            </a:r>
+            <a:r>
+              <a:rPr lang="en-US" sz="1800" dirty="0" err="1">
+                <a:latin typeface="Consolas" pitchFamily="49" charset="0"/>
+                <a:cs typeface="Consolas" pitchFamily="49" charset="0"/>
+              </a:rPr>
+              <a:t>stmtPart.checkConstraints</a:t>
+            </a:r>
+            <a:r>
+              <a:rPr lang="en-US" sz="1800" dirty="0">
+                <a:latin typeface="Consolas" pitchFamily="49" charset="0"/>
+                <a:cs typeface="Consolas" pitchFamily="49" charset="0"/>
+              </a:rPr>
+              <a:t>();</a:t>
             </a:r>
           </a:p>
           <a:p>

</xml_diff>

<commit_message>
mInor changes to one PowerPoint slide
</commit_message>
<xml_diff>
--- a/PowerPoint Slides/09 - Constraint Analysis.pptx
+++ b/PowerPoint Slides/09 - Constraint Analysis.pptx
@@ -5512,60 +5512,39 @@
               <a:t>For CPRL, most type and miscellaneous rules are verified using the method </a:t>
             </a:r>
             <a:r>
-              <a:rPr lang="en-US" dirty="0" err="1">
+              <a:rPr lang="en-US" dirty="0">
                 <a:latin typeface="Consolas" pitchFamily="49" charset="0"/>
                 <a:cs typeface="Consolas" pitchFamily="49" charset="0"/>
               </a:rPr>
-              <a:t>checkConstraints</a:t>
+              <a:t>checkConstraints()</a:t>
+            </a:r>
+            <a:r>
+              <a:rPr lang="en-US" dirty="0"/>
+              <a:t> in the AST classes.</a:t>
+            </a:r>
+          </a:p>
+          <a:p>
+            <a:r>
+              <a:rPr lang="en-US" dirty="0"/>
+              <a:t>Even AST classes that do not have associated constraints will implement the method </a:t>
             </a:r>
             <a:r>
               <a:rPr lang="en-US" dirty="0">
                 <a:latin typeface="Consolas" pitchFamily="49" charset="0"/>
                 <a:cs typeface="Consolas" pitchFamily="49" charset="0"/>
               </a:rPr>
-              <a:t>()</a:t>
-            </a:r>
-            <a:r>
-              <a:rPr lang="en-US" dirty="0"/>
-              <a:t> in the AST classes.</a:t>
-            </a:r>
-          </a:p>
-          <a:p>
-            <a:r>
-              <a:rPr lang="en-US" dirty="0"/>
-              <a:t>Even AST classes that do not have associated constraints will implement the method </a:t>
-            </a:r>
-            <a:r>
-              <a:rPr lang="en-US" dirty="0" err="1">
+              <a:t>checkConstraints()</a:t>
+            </a:r>
+            <a:r>
+              <a:rPr lang="en-US" dirty="0"/>
+              <a:t> if they contain references to objects of other AST classes.  They simply call </a:t>
+            </a:r>
+            <a:r>
+              <a:rPr lang="en-US" dirty="0">
                 <a:latin typeface="Consolas" pitchFamily="49" charset="0"/>
                 <a:cs typeface="Consolas" pitchFamily="49" charset="0"/>
               </a:rPr>
-              <a:t>checkConstraints</a:t>
-            </a:r>
-            <a:r>
-              <a:rPr lang="en-US" dirty="0">
-                <a:latin typeface="Consolas" pitchFamily="49" charset="0"/>
-                <a:cs typeface="Consolas" pitchFamily="49" charset="0"/>
-              </a:rPr>
-              <a:t>()</a:t>
-            </a:r>
-            <a:r>
-              <a:rPr lang="en-US" dirty="0"/>
-              <a:t> if they contain references to objects of other AST classes.  They simply call </a:t>
-            </a:r>
-            <a:r>
-              <a:rPr lang="en-US" dirty="0" err="1">
-                <a:latin typeface="Consolas" pitchFamily="49" charset="0"/>
-                <a:cs typeface="Consolas" pitchFamily="49" charset="0"/>
-              </a:rPr>
-              <a:t>checkConstraints</a:t>
-            </a:r>
-            <a:r>
-              <a:rPr lang="en-US" dirty="0">
-                <a:latin typeface="Consolas" pitchFamily="49" charset="0"/>
-                <a:cs typeface="Consolas" pitchFamily="49" charset="0"/>
-              </a:rPr>
-              <a:t>()</a:t>
+              <a:t>checkConstraints()</a:t>
             </a:r>
             <a:r>
               <a:rPr lang="en-US" dirty="0"/>
@@ -5703,7 +5682,7 @@
         <p:spPr>
           <a:xfrm>
             <a:off x="458787" y="1363663"/>
-            <a:ext cx="8321040" cy="4935537"/>
+            <a:ext cx="8412480" cy="4935537"/>
           </a:xfrm>
         </p:spPr>
         <p:txBody>
@@ -5738,21 +5717,7 @@
                 <a:latin typeface="Consolas" pitchFamily="49" charset="0"/>
                 <a:cs typeface="Consolas" pitchFamily="49" charset="0"/>
               </a:rPr>
-              <a:t>public void </a:t>
-            </a:r>
-            <a:r>
-              <a:rPr lang="en-US" sz="1800" dirty="0" err="1">
-                <a:latin typeface="Consolas" pitchFamily="49" charset="0"/>
-                <a:cs typeface="Consolas" pitchFamily="49" charset="0"/>
-              </a:rPr>
-              <a:t>checkConstraints</a:t>
-            </a:r>
-            <a:r>
-              <a:rPr lang="en-US" sz="1800" dirty="0">
-                <a:latin typeface="Consolas" pitchFamily="49" charset="0"/>
-                <a:cs typeface="Consolas" pitchFamily="49" charset="0"/>
-              </a:rPr>
-              <a:t>()</a:t>
+              <a:t>public void checkConstraints()</a:t>
             </a:r>
           </a:p>
           <a:p>
@@ -5812,7 +5777,7 @@
                 <a:latin typeface="Consolas" pitchFamily="49" charset="0"/>
                 <a:cs typeface="Consolas" pitchFamily="49" charset="0"/>
               </a:rPr>
-              <a:t> should never be null";</a:t>
+              <a:t> should never be null.";</a:t>
             </a:r>
           </a:p>
           <a:p>
@@ -5856,7 +5821,7 @@
                 <a:latin typeface="Consolas" pitchFamily="49" charset="0"/>
                 <a:cs typeface="Consolas" pitchFamily="49" charset="0"/>
               </a:rPr>
-              <a:t> should never be null";</a:t>
+              <a:t> should never be null.";</a:t>
             </a:r>
           </a:p>
           <a:p>
@@ -6170,7 +6135,21 @@
                 <a:latin typeface="Consolas" pitchFamily="49" charset="0"/>
                 <a:cs typeface="Consolas" pitchFamily="49" charset="0"/>
               </a:rPr>
-              <a:t>        decl.checkConstraints();</a:t>
+              <a:t>        </a:t>
+            </a:r>
+            <a:r>
+              <a:rPr lang="en-US" sz="1800" dirty="0" err="1">
+                <a:latin typeface="Consolas" pitchFamily="49" charset="0"/>
+                <a:cs typeface="Consolas" pitchFamily="49" charset="0"/>
+              </a:rPr>
+              <a:t>decl.checkConstraints</a:t>
+            </a:r>
+            <a:r>
+              <a:rPr lang="en-US" sz="1800" dirty="0">
+                <a:latin typeface="Consolas" pitchFamily="49" charset="0"/>
+                <a:cs typeface="Consolas" pitchFamily="49" charset="0"/>
+              </a:rPr>
+              <a:t>();</a:t>
             </a:r>
           </a:p>
           <a:p>
@@ -6215,7 +6194,21 @@
                 <a:latin typeface="Consolas" pitchFamily="49" charset="0"/>
                 <a:cs typeface="Consolas" pitchFamily="49" charset="0"/>
               </a:rPr>
-              <a:t>        decl.checkConstraints();</a:t>
+              <a:t>        </a:t>
+            </a:r>
+            <a:r>
+              <a:rPr lang="en-US" sz="1800" dirty="0" err="1">
+                <a:latin typeface="Consolas" pitchFamily="49" charset="0"/>
+                <a:cs typeface="Consolas" pitchFamily="49" charset="0"/>
+              </a:rPr>
+              <a:t>decl.checkConstraints</a:t>
+            </a:r>
+            <a:r>
+              <a:rPr lang="en-US" sz="1800" dirty="0">
+                <a:latin typeface="Consolas" pitchFamily="49" charset="0"/>
+                <a:cs typeface="Consolas" pitchFamily="49" charset="0"/>
+              </a:rPr>
+              <a:t>();</a:t>
             </a:r>
           </a:p>
           <a:p>
@@ -6394,21 +6387,7 @@
                 <a:latin typeface="Consolas" pitchFamily="49" charset="0"/>
                 <a:cs typeface="Consolas" pitchFamily="49" charset="0"/>
               </a:rPr>
-              <a:t>public void </a:t>
-            </a:r>
-            <a:r>
-              <a:rPr lang="en-US" sz="1800" dirty="0" err="1">
-                <a:latin typeface="Consolas" pitchFamily="49" charset="0"/>
-                <a:cs typeface="Consolas" pitchFamily="49" charset="0"/>
-              </a:rPr>
-              <a:t>checkConstraints</a:t>
-            </a:r>
-            <a:r>
-              <a:rPr lang="en-US" sz="1800" dirty="0">
-                <a:latin typeface="Consolas" pitchFamily="49" charset="0"/>
-                <a:cs typeface="Consolas" pitchFamily="49" charset="0"/>
-              </a:rPr>
-              <a:t>()</a:t>
+              <a:t>public void checkConstraints()</a:t>
             </a:r>
           </a:p>
           <a:p>
@@ -6822,18 +6801,11 @@
               <a:t>using </a:t>
             </a:r>
             <a:r>
-              <a:rPr lang="en-US" sz="2000" dirty="0" err="1">
+              <a:rPr lang="en-US" sz="2000" dirty="0">
                 <a:latin typeface="Consolas" pitchFamily="49" charset="0"/>
                 <a:cs typeface="Consolas" pitchFamily="49" charset="0"/>
               </a:rPr>
-              <a:t>LoopContext</a:t>
-            </a:r>
-            <a:r>
-              <a:rPr lang="en-US" sz="2000" dirty="0">
-                <a:latin typeface="Consolas" pitchFamily="49" charset="0"/>
-                <a:cs typeface="Consolas" pitchFamily="49" charset="0"/>
-              </a:rPr>
-              <a:t>.</a:t>
+              <a:t>LoopContext.</a:t>
             </a:r>
             <a:endParaRPr kumimoji="0" lang="en-US" sz="2000" b="0" i="0" u="none" strike="noStrike" cap="none" normalizeH="0" baseline="0" dirty="0">
               <a:ln>
@@ -7796,18 +7768,11 @@
               <a:t>using </a:t>
             </a:r>
             <a:r>
-              <a:rPr lang="en-US" sz="2000" dirty="0" err="1">
+              <a:rPr lang="en-US" sz="2000" dirty="0">
                 <a:latin typeface="Consolas" pitchFamily="49" charset="0"/>
                 <a:cs typeface="Consolas" pitchFamily="49" charset="0"/>
               </a:rPr>
-              <a:t>SubprogramContext</a:t>
-            </a:r>
-            <a:r>
-              <a:rPr lang="en-US" sz="2000" dirty="0">
-                <a:latin typeface="Consolas" pitchFamily="49" charset="0"/>
-                <a:cs typeface="Consolas" pitchFamily="49" charset="0"/>
-              </a:rPr>
-              <a:t>.</a:t>
+              <a:t>SubprogramContext.</a:t>
             </a:r>
             <a:endParaRPr kumimoji="0" lang="en-US" sz="2000" b="0" i="0" u="none" strike="noStrike" cap="none" normalizeH="0" baseline="0" dirty="0">
               <a:ln>
@@ -8526,19 +8491,7 @@
               <a:rPr lang="en-US" sz="1800" dirty="0">
                 <a:latin typeface="Consolas" pitchFamily="49" charset="0"/>
               </a:rPr>
-              <a:t>public void </a:t>
-            </a:r>
-            <a:r>
-              <a:rPr lang="en-US" sz="1800" dirty="0" err="1">
-                <a:latin typeface="Consolas" pitchFamily="49" charset="0"/>
-              </a:rPr>
-              <a:t>checkConstraints</a:t>
-            </a:r>
-            <a:r>
-              <a:rPr lang="en-US" sz="1800" dirty="0">
-                <a:latin typeface="Consolas" pitchFamily="49" charset="0"/>
-              </a:rPr>
-              <a:t>()</a:t>
+              <a:t>public void checkConstraints()</a:t>
             </a:r>
           </a:p>
           <a:p>
@@ -9198,19 +9151,7 @@
               <a:rPr lang="en-US" sz="1750" dirty="0">
                 <a:latin typeface="Consolas" pitchFamily="49" charset="0"/>
               </a:rPr>
-              <a:t>public void </a:t>
-            </a:r>
-            <a:r>
-              <a:rPr lang="en-US" sz="1750" dirty="0" err="1">
-                <a:latin typeface="Consolas" pitchFamily="49" charset="0"/>
-              </a:rPr>
-              <a:t>checkConstraints</a:t>
-            </a:r>
-            <a:r>
-              <a:rPr lang="en-US" sz="1750" dirty="0">
-                <a:latin typeface="Consolas" pitchFamily="49" charset="0"/>
-              </a:rPr>
-              <a:t>()</a:t>
+              <a:t>public void checkConstraints()</a:t>
             </a:r>
           </a:p>
           <a:p>
@@ -10025,7 +9966,7 @@
               <a:t>, </a:t>
             </a:r>
             <a:r>
-              <a:rPr lang="en-US" dirty="0" err="1">
+              <a:rPr lang="en-US" dirty="0">
                 <a:latin typeface="Consolas" pitchFamily="49" charset="0"/>
                 <a:cs typeface="Consolas" pitchFamily="49" charset="0"/>
               </a:rPr>
@@ -10036,7 +9977,7 @@
               <a:t>, and </a:t>
             </a:r>
             <a:r>
-              <a:rPr lang="en-US" dirty="0" err="1">
+              <a:rPr lang="en-US" dirty="0">
                 <a:latin typeface="Consolas" panose="020B0609020204030204" pitchFamily="49" charset="0"/>
               </a:rPr>
               <a:t>SubprogramContext</a:t>

</xml_diff>